<commit_message>
ULA screen rendering figure updated.
</commit_message>
<xml_diff>
--- a/Spect.Net.Spectrum/_Documents/Design.pptx
+++ b/Spect.Net.Spectrum/_Documents/Design.pptx
@@ -5,8 +5,7 @@
     <p:sldMasterId id="2147483648" r:id="rId1"/>
   </p:sldMasterIdLst>
   <p:sldIdLst>
-    <p:sldId id="256" r:id="rId2"/>
-    <p:sldId id="257" r:id="rId3"/>
+    <p:sldId id="257" r:id="rId2"/>
   </p:sldIdLst>
   <p:sldSz cx="12192000" cy="6858000"/>
   <p:notesSz cx="6858000" cy="9144000"/>
@@ -255,7 +254,7 @@
           <a:p>
             <a:fld id="{3E964EAF-7DD1-45CB-A5FB-AB2E71BFE0F0}" type="datetimeFigureOut">
               <a:rPr lang="hu-HU" smtClean="0"/>
-              <a:t>2017. 02. 19.</a:t>
+              <a:t>2017. 02. 20.</a:t>
             </a:fld>
             <a:endParaRPr lang="hu-HU"/>
           </a:p>
@@ -425,7 +424,7 @@
           <a:p>
             <a:fld id="{3E964EAF-7DD1-45CB-A5FB-AB2E71BFE0F0}" type="datetimeFigureOut">
               <a:rPr lang="hu-HU" smtClean="0"/>
-              <a:t>2017. 02. 19.</a:t>
+              <a:t>2017. 02. 20.</a:t>
             </a:fld>
             <a:endParaRPr lang="hu-HU"/>
           </a:p>
@@ -605,7 +604,7 @@
           <a:p>
             <a:fld id="{3E964EAF-7DD1-45CB-A5FB-AB2E71BFE0F0}" type="datetimeFigureOut">
               <a:rPr lang="hu-HU" smtClean="0"/>
-              <a:t>2017. 02. 19.</a:t>
+              <a:t>2017. 02. 20.</a:t>
             </a:fld>
             <a:endParaRPr lang="hu-HU"/>
           </a:p>
@@ -775,7 +774,7 @@
           <a:p>
             <a:fld id="{3E964EAF-7DD1-45CB-A5FB-AB2E71BFE0F0}" type="datetimeFigureOut">
               <a:rPr lang="hu-HU" smtClean="0"/>
-              <a:t>2017. 02. 19.</a:t>
+              <a:t>2017. 02. 20.</a:t>
             </a:fld>
             <a:endParaRPr lang="hu-HU"/>
           </a:p>
@@ -1021,7 +1020,7 @@
           <a:p>
             <a:fld id="{3E964EAF-7DD1-45CB-A5FB-AB2E71BFE0F0}" type="datetimeFigureOut">
               <a:rPr lang="hu-HU" smtClean="0"/>
-              <a:t>2017. 02. 19.</a:t>
+              <a:t>2017. 02. 20.</a:t>
             </a:fld>
             <a:endParaRPr lang="hu-HU"/>
           </a:p>
@@ -1253,7 +1252,7 @@
           <a:p>
             <a:fld id="{3E964EAF-7DD1-45CB-A5FB-AB2E71BFE0F0}" type="datetimeFigureOut">
               <a:rPr lang="hu-HU" smtClean="0"/>
-              <a:t>2017. 02. 19.</a:t>
+              <a:t>2017. 02. 20.</a:t>
             </a:fld>
             <a:endParaRPr lang="hu-HU"/>
           </a:p>
@@ -1620,7 +1619,7 @@
           <a:p>
             <a:fld id="{3E964EAF-7DD1-45CB-A5FB-AB2E71BFE0F0}" type="datetimeFigureOut">
               <a:rPr lang="hu-HU" smtClean="0"/>
-              <a:t>2017. 02. 19.</a:t>
+              <a:t>2017. 02. 20.</a:t>
             </a:fld>
             <a:endParaRPr lang="hu-HU"/>
           </a:p>
@@ -1738,7 +1737,7 @@
           <a:p>
             <a:fld id="{3E964EAF-7DD1-45CB-A5FB-AB2E71BFE0F0}" type="datetimeFigureOut">
               <a:rPr lang="hu-HU" smtClean="0"/>
-              <a:t>2017. 02. 19.</a:t>
+              <a:t>2017. 02. 20.</a:t>
             </a:fld>
             <a:endParaRPr lang="hu-HU"/>
           </a:p>
@@ -1833,7 +1832,7 @@
           <a:p>
             <a:fld id="{3E964EAF-7DD1-45CB-A5FB-AB2E71BFE0F0}" type="datetimeFigureOut">
               <a:rPr lang="hu-HU" smtClean="0"/>
-              <a:t>2017. 02. 19.</a:t>
+              <a:t>2017. 02. 20.</a:t>
             </a:fld>
             <a:endParaRPr lang="hu-HU"/>
           </a:p>
@@ -2110,7 +2109,7 @@
           <a:p>
             <a:fld id="{3E964EAF-7DD1-45CB-A5FB-AB2E71BFE0F0}" type="datetimeFigureOut">
               <a:rPr lang="hu-HU" smtClean="0"/>
-              <a:t>2017. 02. 19.</a:t>
+              <a:t>2017. 02. 20.</a:t>
             </a:fld>
             <a:endParaRPr lang="hu-HU"/>
           </a:p>
@@ -2363,7 +2362,7 @@
           <a:p>
             <a:fld id="{3E964EAF-7DD1-45CB-A5FB-AB2E71BFE0F0}" type="datetimeFigureOut">
               <a:rPr lang="hu-HU" smtClean="0"/>
-              <a:t>2017. 02. 19.</a:t>
+              <a:t>2017. 02. 20.</a:t>
             </a:fld>
             <a:endParaRPr lang="hu-HU"/>
           </a:p>
@@ -2576,7 +2575,7 @@
           <a:p>
             <a:fld id="{3E964EAF-7DD1-45CB-A5FB-AB2E71BFE0F0}" type="datetimeFigureOut">
               <a:rPr lang="hu-HU" smtClean="0"/>
-              <a:t>2017. 02. 19.</a:t>
+              <a:t>2017. 02. 20.</a:t>
             </a:fld>
             <a:endParaRPr lang="hu-HU"/>
           </a:p>
@@ -2983,74 +2982,6 @@
       </p:grpSpPr>
       <p:sp>
         <p:nvSpPr>
-          <p:cNvPr id="2" name="Title 1"/>
-          <p:cNvSpPr>
-            <a:spLocks noGrp="1"/>
-          </p:cNvSpPr>
-          <p:nvPr>
-            <p:ph type="ctrTitle"/>
-          </p:nvPr>
-        </p:nvSpPr>
-        <p:spPr/>
-        <p:txBody>
-          <a:bodyPr/>
-          <a:lstStyle/>
-          <a:p>
-            <a:endParaRPr lang="hu-HU"/>
-          </a:p>
-        </p:txBody>
-      </p:sp>
-      <p:sp>
-        <p:nvSpPr>
-          <p:cNvPr id="3" name="Subtitle 2"/>
-          <p:cNvSpPr>
-            <a:spLocks noGrp="1"/>
-          </p:cNvSpPr>
-          <p:nvPr>
-            <p:ph type="subTitle" idx="1"/>
-          </p:nvPr>
-        </p:nvSpPr>
-        <p:spPr/>
-        <p:txBody>
-          <a:bodyPr/>
-          <a:lstStyle/>
-          <a:p>
-            <a:endParaRPr lang="hu-HU"/>
-          </a:p>
-        </p:txBody>
-      </p:sp>
-    </p:spTree>
-    <p:extLst>
-      <p:ext uri="{BB962C8B-B14F-4D97-AF65-F5344CB8AC3E}">
-        <p14:creationId xmlns:p14="http://schemas.microsoft.com/office/powerpoint/2010/main" val="2102809481"/>
-      </p:ext>
-    </p:extLst>
-  </p:cSld>
-  <p:clrMapOvr>
-    <a:masterClrMapping/>
-  </p:clrMapOvr>
-</p:sld>
-</file>
-
-<file path=ppt/slides/slide2.xml><?xml version="1.0" encoding="utf-8"?>
-<p:sld xmlns:a="http://schemas.openxmlformats.org/drawingml/2006/main" xmlns:r="http://schemas.openxmlformats.org/officeDocument/2006/relationships" xmlns:p="http://schemas.openxmlformats.org/presentationml/2006/main">
-  <p:cSld>
-    <p:spTree>
-      <p:nvGrpSpPr>
-        <p:cNvPr id="1" name=""/>
-        <p:cNvGrpSpPr/>
-        <p:nvPr/>
-      </p:nvGrpSpPr>
-      <p:grpSpPr>
-        <a:xfrm>
-          <a:off x="0" y="0"/>
-          <a:ext cx="0" cy="0"/>
-          <a:chOff x="0" y="0"/>
-          <a:chExt cx="0" cy="0"/>
-        </a:xfrm>
-      </p:grpSpPr>
-      <p:sp>
-        <p:nvSpPr>
           <p:cNvPr id="5" name="Rectangle 4"/>
           <p:cNvSpPr/>
           <p:nvPr/>
@@ -3073,6 +3004,13 @@
               <a:schemeClr val="bg1"/>
             </a:bgClr>
           </a:pattFill>
+          <a:ln w="19050">
+            <a:solidFill>
+              <a:schemeClr val="bg2">
+                <a:lumMod val="25000"/>
+              </a:schemeClr>
+            </a:solidFill>
+          </a:ln>
         </p:spPr>
         <p:style>
           <a:lnRef idx="2">
@@ -3104,7 +3042,7 @@
                   </a:schemeClr>
                 </a:solidFill>
               </a:rPr>
-              <a:t>Invisible</a:t>
+              <a:t>Full</a:t>
             </a:r>
             <a:r>
               <a:rPr lang="hu-HU" dirty="0">
@@ -3126,7 +3064,7 @@
                   </a:schemeClr>
                 </a:solidFill>
               </a:rPr>
-              <a:t>Area</a:t>
+              <a:t>area</a:t>
             </a:r>
             <a:r>
               <a:rPr lang="hu-HU" dirty="0">
@@ -3137,7 +3075,7 @@
                   </a:schemeClr>
                 </a:solidFill>
               </a:rPr>
-              <a:t> (448x320 </a:t>
+              <a:t> </a:t>
             </a:r>
             <a:r>
               <a:rPr lang="hu-HU" dirty="0" err="1">
@@ -3148,7 +3086,51 @@
                   </a:schemeClr>
                 </a:solidFill>
               </a:rPr>
-              <a:t>pixels</a:t>
+              <a:t>managed</a:t>
+            </a:r>
+            <a:r>
+              <a:rPr lang="hu-HU" dirty="0">
+                <a:solidFill>
+                  <a:schemeClr val="tx1">
+                    <a:lumMod val="75000"/>
+                    <a:lumOff val="25000"/>
+                  </a:schemeClr>
+                </a:solidFill>
+              </a:rPr>
+              <a:t> </a:t>
+            </a:r>
+            <a:r>
+              <a:rPr lang="hu-HU" dirty="0" err="1">
+                <a:solidFill>
+                  <a:schemeClr val="tx1">
+                    <a:lumMod val="75000"/>
+                    <a:lumOff val="25000"/>
+                  </a:schemeClr>
+                </a:solidFill>
+              </a:rPr>
+              <a:t>by</a:t>
+            </a:r>
+            <a:r>
+              <a:rPr lang="hu-HU" dirty="0">
+                <a:solidFill>
+                  <a:schemeClr val="tx1">
+                    <a:lumMod val="75000"/>
+                    <a:lumOff val="25000"/>
+                  </a:schemeClr>
+                </a:solidFill>
+              </a:rPr>
+              <a:t> ULA (224T x 320 </a:t>
+            </a:r>
+            <a:r>
+              <a:rPr lang="hu-HU" dirty="0" err="1">
+                <a:solidFill>
+                  <a:schemeClr val="tx1">
+                    <a:lumMod val="75000"/>
+                    <a:lumOff val="25000"/>
+                  </a:schemeClr>
+                </a:solidFill>
+              </a:rPr>
+              <a:t>lines</a:t>
             </a:r>
             <a:r>
               <a:rPr lang="hu-HU" dirty="0">
@@ -3183,6 +3165,13 @@
               <a:lumMod val="95000"/>
             </a:schemeClr>
           </a:solidFill>
+          <a:ln w="19050">
+            <a:solidFill>
+              <a:schemeClr val="bg2">
+                <a:lumMod val="25000"/>
+              </a:schemeClr>
+            </a:solidFill>
+          </a:ln>
         </p:spPr>
         <p:style>
           <a:lnRef idx="2">
@@ -3247,7 +3236,7 @@
                   </a:schemeClr>
                 </a:solidFill>
               </a:rPr>
-              <a:t> (352x304 </a:t>
+              <a:t> (176T x 304 </a:t>
             </a:r>
             <a:r>
               <a:rPr lang="hu-HU" dirty="0" err="1">
@@ -3258,7 +3247,7 @@
                   </a:schemeClr>
                 </a:solidFill>
               </a:rPr>
-              <a:t>pixels</a:t>
+              <a:t>lines</a:t>
             </a:r>
             <a:r>
               <a:rPr lang="hu-HU" dirty="0">
@@ -3293,7 +3282,13 @@
               <a:lumMod val="85000"/>
             </a:schemeClr>
           </a:solidFill>
-          <a:ln w="12700"/>
+          <a:ln w="19050">
+            <a:solidFill>
+              <a:schemeClr val="bg2">
+                <a:lumMod val="25000"/>
+              </a:schemeClr>
+            </a:solidFill>
+          </a:ln>
         </p:spPr>
         <p:style>
           <a:lnRef idx="2">
@@ -3344,7 +3339,7 @@
                   </a:schemeClr>
                 </a:solidFill>
               </a:rPr>
-              <a:t> (256x192 </a:t>
+              <a:t> (128T x 192 </a:t>
             </a:r>
             <a:r>
               <a:rPr lang="hu-HU" dirty="0" err="1">
@@ -3354,7 +3349,7 @@
                   </a:schemeClr>
                 </a:solidFill>
               </a:rPr>
-              <a:t>pixels</a:t>
+              <a:t>lines</a:t>
             </a:r>
             <a:r>
               <a:rPr lang="hu-HU" dirty="0">
@@ -3409,7 +3404,7 @@
         </p:nvCxnSpPr>
         <p:spPr>
           <a:xfrm flipH="1">
-            <a:off x="1952640" y="549000"/>
+            <a:off x="1945266" y="549000"/>
             <a:ext cx="3360" cy="360000"/>
           </a:xfrm>
           <a:prstGeom prst="line">
@@ -4468,6 +4463,316 @@
           </a:fontRef>
         </p:style>
       </p:cxnSp>
+      <p:sp>
+        <p:nvSpPr>
+          <p:cNvPr id="42" name="TextBox 41"/>
+          <p:cNvSpPr txBox="1"/>
+          <p:nvPr/>
+        </p:nvSpPr>
+        <p:spPr>
+          <a:xfrm>
+            <a:off x="9193284" y="581439"/>
+            <a:ext cx="1492716" cy="261610"/>
+          </a:xfrm>
+          <a:prstGeom prst="rect">
+            <a:avLst/>
+          </a:prstGeom>
+          <a:noFill/>
+        </p:spPr>
+        <p:txBody>
+          <a:bodyPr wrap="none" rtlCol="0">
+            <a:spAutoFit/>
+          </a:bodyPr>
+          <a:lstStyle/>
+          <a:p>
+            <a:r>
+              <a:rPr lang="hu-HU" sz="1100" dirty="0" err="1">
+                <a:latin typeface="Consolas" panose="020B0609020204030204" pitchFamily="49" charset="0"/>
+              </a:rPr>
+              <a:t>VerticalSyncLines</a:t>
+            </a:r>
+            <a:endParaRPr lang="hu-HU" sz="1100" dirty="0">
+              <a:latin typeface="Consolas" panose="020B0609020204030204" pitchFamily="49" charset="0"/>
+            </a:endParaRPr>
+          </a:p>
+        </p:txBody>
+      </p:sp>
+      <p:sp>
+        <p:nvSpPr>
+          <p:cNvPr id="43" name="TextBox 42"/>
+          <p:cNvSpPr txBox="1"/>
+          <p:nvPr/>
+        </p:nvSpPr>
+        <p:spPr>
+          <a:xfrm>
+            <a:off x="9193283" y="748248"/>
+            <a:ext cx="2031325" cy="261610"/>
+          </a:xfrm>
+          <a:prstGeom prst="rect">
+            <a:avLst/>
+          </a:prstGeom>
+          <a:noFill/>
+        </p:spPr>
+        <p:txBody>
+          <a:bodyPr wrap="none" rtlCol="0">
+            <a:spAutoFit/>
+          </a:bodyPr>
+          <a:lstStyle/>
+          <a:p>
+            <a:r>
+              <a:rPr lang="hu-HU" sz="1100" dirty="0" err="1">
+                <a:latin typeface="Consolas" panose="020B0609020204030204" pitchFamily="49" charset="0"/>
+              </a:rPr>
+              <a:t>NonVisibleBorderTopLines</a:t>
+            </a:r>
+            <a:endParaRPr lang="hu-HU" sz="1100" dirty="0">
+              <a:latin typeface="Consolas" panose="020B0609020204030204" pitchFamily="49" charset="0"/>
+            </a:endParaRPr>
+          </a:p>
+        </p:txBody>
+      </p:sp>
+      <p:sp>
+        <p:nvSpPr>
+          <p:cNvPr id="44" name="TextBox 43"/>
+          <p:cNvSpPr txBox="1"/>
+          <p:nvPr/>
+        </p:nvSpPr>
+        <p:spPr>
+          <a:xfrm>
+            <a:off x="9244116" y="1052390"/>
+            <a:ext cx="1261884" cy="261610"/>
+          </a:xfrm>
+          <a:prstGeom prst="rect">
+            <a:avLst/>
+          </a:prstGeom>
+          <a:noFill/>
+        </p:spPr>
+        <p:txBody>
+          <a:bodyPr wrap="none" rtlCol="0">
+            <a:spAutoFit/>
+          </a:bodyPr>
+          <a:lstStyle/>
+          <a:p>
+            <a:r>
+              <a:rPr lang="hu-HU" sz="1100" dirty="0" err="1">
+                <a:latin typeface="Consolas" panose="020B0609020204030204" pitchFamily="49" charset="0"/>
+              </a:rPr>
+              <a:t>BorderTopLines</a:t>
+            </a:r>
+            <a:endParaRPr lang="hu-HU" sz="1100" dirty="0">
+              <a:latin typeface="Consolas" panose="020B0609020204030204" pitchFamily="49" charset="0"/>
+            </a:endParaRPr>
+          </a:p>
+        </p:txBody>
+      </p:sp>
+      <p:cxnSp>
+        <p:nvCxnSpPr>
+          <p:cNvPr id="6" name="Straight Arrow Connector 5"/>
+          <p:cNvCxnSpPr>
+            <a:cxnSpLocks/>
+            <a:stCxn id="44" idx="1"/>
+          </p:cNvCxnSpPr>
+          <p:nvPr/>
+        </p:nvCxnSpPr>
+        <p:spPr>
+          <a:xfrm flipH="1">
+            <a:off x="9066000" y="1183195"/>
+            <a:ext cx="178116" cy="0"/>
+          </a:xfrm>
+          <a:prstGeom prst="straightConnector1">
+            <a:avLst/>
+          </a:prstGeom>
+          <a:ln>
+            <a:tailEnd type="arrow"/>
+          </a:ln>
+        </p:spPr>
+        <p:style>
+          <a:lnRef idx="1">
+            <a:schemeClr val="accent1"/>
+          </a:lnRef>
+          <a:fillRef idx="0">
+            <a:schemeClr val="accent1"/>
+          </a:fillRef>
+          <a:effectRef idx="0">
+            <a:schemeClr val="accent1"/>
+          </a:effectRef>
+          <a:fontRef idx="minor">
+            <a:schemeClr val="tx1"/>
+          </a:fontRef>
+        </p:style>
+      </p:cxnSp>
+      <p:sp>
+        <p:nvSpPr>
+          <p:cNvPr id="45" name="TextBox 44"/>
+          <p:cNvSpPr txBox="1"/>
+          <p:nvPr/>
+        </p:nvSpPr>
+        <p:spPr>
+          <a:xfrm>
+            <a:off x="9244116" y="3302390"/>
+            <a:ext cx="1107996" cy="261610"/>
+          </a:xfrm>
+          <a:prstGeom prst="rect">
+            <a:avLst/>
+          </a:prstGeom>
+          <a:noFill/>
+        </p:spPr>
+        <p:txBody>
+          <a:bodyPr wrap="none" rtlCol="0">
+            <a:spAutoFit/>
+          </a:bodyPr>
+          <a:lstStyle/>
+          <a:p>
+            <a:r>
+              <a:rPr lang="hu-HU" sz="1100" dirty="0" err="1">
+                <a:latin typeface="Consolas" panose="020B0609020204030204" pitchFamily="49" charset="0"/>
+              </a:rPr>
+              <a:t>DisplayLines</a:t>
+            </a:r>
+            <a:endParaRPr lang="hu-HU" sz="1100" dirty="0">
+              <a:latin typeface="Consolas" panose="020B0609020204030204" pitchFamily="49" charset="0"/>
+            </a:endParaRPr>
+          </a:p>
+        </p:txBody>
+      </p:sp>
+      <p:cxnSp>
+        <p:nvCxnSpPr>
+          <p:cNvPr id="46" name="Straight Arrow Connector 45"/>
+          <p:cNvCxnSpPr>
+            <a:cxnSpLocks/>
+          </p:cNvCxnSpPr>
+          <p:nvPr/>
+        </p:nvCxnSpPr>
+        <p:spPr>
+          <a:xfrm flipH="1">
+            <a:off x="9066000" y="3429000"/>
+            <a:ext cx="178116" cy="0"/>
+          </a:xfrm>
+          <a:prstGeom prst="straightConnector1">
+            <a:avLst/>
+          </a:prstGeom>
+          <a:ln>
+            <a:tailEnd type="arrow"/>
+          </a:ln>
+        </p:spPr>
+        <p:style>
+          <a:lnRef idx="1">
+            <a:schemeClr val="accent1"/>
+          </a:lnRef>
+          <a:fillRef idx="0">
+            <a:schemeClr val="accent1"/>
+          </a:fillRef>
+          <a:effectRef idx="0">
+            <a:schemeClr val="accent1"/>
+          </a:effectRef>
+          <a:fontRef idx="minor">
+            <a:schemeClr val="tx1"/>
+          </a:fontRef>
+        </p:style>
+      </p:cxnSp>
+      <p:cxnSp>
+        <p:nvCxnSpPr>
+          <p:cNvPr id="48" name="Straight Arrow Connector 47"/>
+          <p:cNvCxnSpPr>
+            <a:cxnSpLocks/>
+          </p:cNvCxnSpPr>
+          <p:nvPr/>
+        </p:nvCxnSpPr>
+        <p:spPr>
+          <a:xfrm flipH="1">
+            <a:off x="9067226" y="6039000"/>
+            <a:ext cx="178116" cy="0"/>
+          </a:xfrm>
+          <a:prstGeom prst="straightConnector1">
+            <a:avLst/>
+          </a:prstGeom>
+          <a:ln>
+            <a:tailEnd type="arrow"/>
+          </a:ln>
+        </p:spPr>
+        <p:style>
+          <a:lnRef idx="1">
+            <a:schemeClr val="accent1"/>
+          </a:lnRef>
+          <a:fillRef idx="0">
+            <a:schemeClr val="accent1"/>
+          </a:fillRef>
+          <a:effectRef idx="0">
+            <a:schemeClr val="accent1"/>
+          </a:effectRef>
+          <a:fontRef idx="minor">
+            <a:schemeClr val="tx1"/>
+          </a:fontRef>
+        </p:style>
+      </p:cxnSp>
+      <p:sp>
+        <p:nvSpPr>
+          <p:cNvPr id="51" name="TextBox 50"/>
+          <p:cNvSpPr txBox="1"/>
+          <p:nvPr/>
+        </p:nvSpPr>
+        <p:spPr>
+          <a:xfrm>
+            <a:off x="9244116" y="5908195"/>
+            <a:ext cx="1492716" cy="261610"/>
+          </a:xfrm>
+          <a:prstGeom prst="rect">
+            <a:avLst/>
+          </a:prstGeom>
+          <a:noFill/>
+        </p:spPr>
+        <p:txBody>
+          <a:bodyPr wrap="none" rtlCol="0">
+            <a:spAutoFit/>
+          </a:bodyPr>
+          <a:lstStyle/>
+          <a:p>
+            <a:r>
+              <a:rPr lang="hu-HU" sz="1100" dirty="0" err="1">
+                <a:latin typeface="Consolas" panose="020B0609020204030204" pitchFamily="49" charset="0"/>
+              </a:rPr>
+              <a:t>BorderBottomLines</a:t>
+            </a:r>
+            <a:endParaRPr lang="hu-HU" sz="1100" dirty="0">
+              <a:latin typeface="Consolas" panose="020B0609020204030204" pitchFamily="49" charset="0"/>
+            </a:endParaRPr>
+          </a:p>
+        </p:txBody>
+      </p:sp>
+      <p:sp>
+        <p:nvSpPr>
+          <p:cNvPr id="52" name="TextBox 51"/>
+          <p:cNvSpPr txBox="1"/>
+          <p:nvPr/>
+        </p:nvSpPr>
+        <p:spPr>
+          <a:xfrm>
+            <a:off x="9244116" y="6212337"/>
+            <a:ext cx="2262158" cy="261610"/>
+          </a:xfrm>
+          <a:prstGeom prst="rect">
+            <a:avLst/>
+          </a:prstGeom>
+          <a:noFill/>
+        </p:spPr>
+        <p:txBody>
+          <a:bodyPr wrap="none" rtlCol="0">
+            <a:spAutoFit/>
+          </a:bodyPr>
+          <a:lstStyle/>
+          <a:p>
+            <a:r>
+              <a:rPr lang="hu-HU" sz="1100" dirty="0" err="1">
+                <a:latin typeface="Consolas" panose="020B0609020204030204" pitchFamily="49" charset="0"/>
+              </a:rPr>
+              <a:t>NonVisibleBorderBottomLines</a:t>
+            </a:r>
+            <a:endParaRPr lang="hu-HU" sz="1100" dirty="0">
+              <a:latin typeface="Consolas" panose="020B0609020204030204" pitchFamily="49" charset="0"/>
+            </a:endParaRPr>
+          </a:p>
+        </p:txBody>
+      </p:sp>
     </p:spTree>
     <p:extLst>
       <p:ext uri="{BB962C8B-B14F-4D97-AF65-F5344CB8AC3E}">

</xml_diff>